<commit_message>
next iteration of poster
</commit_message>
<xml_diff>
--- a/PosterPPT.pptx
+++ b/PosterPPT.pptx
@@ -11526,7 +11526,7 @@
               <a:buNone/>
             </a:pPr>
             <a:r>
-              <a:rPr lang="en-US" sz="3600" b="0" i="0" u="none" strike="noStrike" cap="none" dirty="0">
+              <a:rPr lang="en-US" sz="4800" b="0" i="0" u="none" strike="noStrike" cap="none" dirty="0">
                 <a:solidFill>
                   <a:schemeClr val="dk1"/>
                 </a:solidFill>
@@ -11538,7 +11538,7 @@
               <a:t>Learning to play a musical instrument can be a difficult and time consuming process. Regular practice is an important part of learning an instrument. Thus, in order to effectively learn an instrument, practice must be done in an efficient manner. For a stringed instrument such as a fiddle or violin, this means checking if the open strings are tuned correctly as well as checking if the fiddler’s fingers are in the correct position. Our application, </a:t>
             </a:r>
             <a:r>
-              <a:rPr lang="en-US" sz="3600" b="0" i="0" u="none" strike="noStrike" cap="none" dirty="0" err="1">
+              <a:rPr lang="en-US" sz="4800" b="0" i="0" u="none" strike="noStrike" cap="none" dirty="0" err="1">
                 <a:solidFill>
                   <a:schemeClr val="dk1"/>
                 </a:solidFill>
@@ -11550,7 +11550,7 @@
               <a:t>FidLin</a:t>
             </a:r>
             <a:r>
-              <a:rPr lang="en-US" sz="3600" b="0" i="0" u="none" strike="noStrike" cap="none" dirty="0">
+              <a:rPr lang="en-US" sz="4800" b="0" i="0" u="none" strike="noStrike" cap="none" dirty="0">
                 <a:solidFill>
                   <a:schemeClr val="dk1"/>
                 </a:solidFill>
@@ -11559,10 +11559,10 @@
                 <a:cs typeface="NTR" panose="020B0604020202020204" charset="0"/>
                 <a:sym typeface="Calibri"/>
               </a:rPr>
-              <a:t>, is created to help fiddle, and violin players alike practice properly in order to get the most effective usage of their time rehearsing. Thus, </a:t>
+              <a:t>, is created to help fiddle, and violin players alike practice properly in order to get the most effective usage of their time rehearsing. </a:t>
             </a:r>
             <a:r>
-              <a:rPr lang="en-US" sz="3600" b="0" i="0" u="none" strike="noStrike" cap="none" dirty="0" err="1">
+              <a:rPr lang="en-US" sz="4800" b="0" i="0" u="none" strike="noStrike" cap="none" dirty="0" err="1">
                 <a:solidFill>
                   <a:schemeClr val="dk1"/>
                 </a:solidFill>
@@ -11574,7 +11574,7 @@
               <a:t>FidLin</a:t>
             </a:r>
             <a:r>
-              <a:rPr lang="en-US" sz="3600" b="0" i="0" u="none" strike="noStrike" cap="none" dirty="0">
+              <a:rPr lang="en-US" sz="4800" b="0" i="0" u="none" strike="noStrike" cap="none" dirty="0">
                 <a:solidFill>
                   <a:schemeClr val="dk1"/>
                 </a:solidFill>
@@ -11583,33 +11583,9 @@
                 <a:cs typeface="NTR" panose="020B0604020202020204" charset="0"/>
                 <a:sym typeface="Calibri"/>
               </a:rPr>
-              <a:t> will include a profile system to help the user keep up with their progress as they practice their instrument. </a:t>
+              <a:t> allows the user to properly tune their open strings. By including a metronome, our application also assists musicians to keep a tempo. In order to assist with finger positions and intonation, our application provides practice scales for the user to play along with while providing feedback on what the fiddle player plays.</a:t>
             </a:r>
-            <a:r>
-              <a:rPr lang="en-US" sz="3600" b="0" i="0" u="none" strike="noStrike" cap="none" dirty="0" err="1">
-                <a:solidFill>
-                  <a:schemeClr val="dk1"/>
-                </a:solidFill>
-                <a:latin typeface="NTR" panose="020B0604020202020204" charset="0"/>
-                <a:ea typeface="Calibri"/>
-                <a:cs typeface="NTR" panose="020B0604020202020204" charset="0"/>
-                <a:sym typeface="Calibri"/>
-              </a:rPr>
-              <a:t>FidLin</a:t>
-            </a:r>
-            <a:r>
-              <a:rPr lang="en-US" sz="3600" b="0" i="0" u="none" strike="noStrike" cap="none" dirty="0">
-                <a:solidFill>
-                  <a:schemeClr val="dk1"/>
-                </a:solidFill>
-                <a:latin typeface="NTR" panose="020B0604020202020204" charset="0"/>
-                <a:ea typeface="Calibri"/>
-                <a:cs typeface="NTR" panose="020B0604020202020204" charset="0"/>
-                <a:sym typeface="Calibri"/>
-              </a:rPr>
-              <a:t> allows the user to properly tune their open strings. Additionally, our application gives the user feedback while they play to allow them to determine where they need more practice. By including a metronome, our application also assists musicians to keep a tempo. In order to assist with finger positions and intonation, our application provides practice scales for the user to play along with while providing feedback on what the fiddle player plays. By providing these abilities our application assists fiddle players to make the most of their time practicing. </a:t>
-            </a:r>
-            <a:endParaRPr sz="3600" b="0" i="0" u="none" strike="noStrike" cap="none" dirty="0">
+            <a:endParaRPr sz="4800" b="0" i="0" u="none" strike="noStrike" cap="none" dirty="0">
               <a:solidFill>
                 <a:schemeClr val="dk1"/>
               </a:solidFill>
@@ -11721,172 +11697,6 @@
               <a:t>Methods &amp; tools used</a:t>
             </a:r>
             <a:endParaRPr dirty="0"/>
-          </a:p>
-        </p:txBody>
-      </p:sp>
-      <p:sp>
-        <p:nvSpPr>
-          <p:cNvPr id="92" name="Google Shape;92;p13"/>
-          <p:cNvSpPr txBox="1"/>
-          <p:nvPr/>
-        </p:nvSpPr>
-        <p:spPr>
-          <a:xfrm>
-            <a:off x="741220" y="27432000"/>
-            <a:ext cx="9448800" cy="3754874"/>
-          </a:xfrm>
-          <a:prstGeom prst="rect">
-            <a:avLst/>
-          </a:prstGeom>
-          <a:noFill/>
-          <a:ln>
-            <a:noFill/>
-          </a:ln>
-        </p:spPr>
-        <p:txBody>
-          <a:bodyPr spcFirstLastPara="1" wrap="square" lIns="91425" tIns="45700" rIns="91425" bIns="45700" anchor="t" anchorCtr="0">
-            <a:noAutofit/>
-          </a:bodyPr>
-          <a:lstStyle/>
-          <a:p>
-            <a:pPr marL="0" marR="0" lvl="0" indent="0" algn="l" rtl="0">
-              <a:spcBef>
-                <a:spcPts val="0"/>
-              </a:spcBef>
-              <a:spcAft>
-                <a:spcPts val="0"/>
-              </a:spcAft>
-              <a:buNone/>
-            </a:pPr>
-            <a:endParaRPr sz="3400" b="0" i="0" u="none" strike="noStrike" cap="none">
-              <a:solidFill>
-                <a:schemeClr val="dk1"/>
-              </a:solidFill>
-              <a:latin typeface="Arial"/>
-              <a:ea typeface="Arial"/>
-              <a:cs typeface="Arial"/>
-              <a:sym typeface="Arial"/>
-            </a:endParaRPr>
-          </a:p>
-          <a:p>
-            <a:pPr marL="0" marR="0" lvl="0" indent="0" algn="l" rtl="0">
-              <a:spcBef>
-                <a:spcPts val="0"/>
-              </a:spcBef>
-              <a:spcAft>
-                <a:spcPts val="0"/>
-              </a:spcAft>
-              <a:buNone/>
-            </a:pPr>
-            <a:endParaRPr sz="3400" b="0" i="0" u="none" strike="noStrike" cap="none">
-              <a:solidFill>
-                <a:schemeClr val="dk1"/>
-              </a:solidFill>
-              <a:latin typeface="Arial"/>
-              <a:ea typeface="Arial"/>
-              <a:cs typeface="Arial"/>
-              <a:sym typeface="Arial"/>
-            </a:endParaRPr>
-          </a:p>
-          <a:p>
-            <a:pPr marL="0" marR="0" lvl="0" indent="0" algn="l" rtl="0">
-              <a:spcBef>
-                <a:spcPts val="0"/>
-              </a:spcBef>
-              <a:spcAft>
-                <a:spcPts val="0"/>
-              </a:spcAft>
-              <a:buNone/>
-            </a:pPr>
-            <a:endParaRPr sz="3400" b="0" i="0" u="none" strike="noStrike" cap="none">
-              <a:solidFill>
-                <a:schemeClr val="dk1"/>
-              </a:solidFill>
-              <a:latin typeface="Arial"/>
-              <a:ea typeface="Arial"/>
-              <a:cs typeface="Arial"/>
-              <a:sym typeface="Arial"/>
-            </a:endParaRPr>
-          </a:p>
-          <a:p>
-            <a:pPr marL="0" marR="0" lvl="0" indent="0" algn="l" rtl="0">
-              <a:spcBef>
-                <a:spcPts val="0"/>
-              </a:spcBef>
-              <a:spcAft>
-                <a:spcPts val="0"/>
-              </a:spcAft>
-              <a:buNone/>
-            </a:pPr>
-            <a:endParaRPr sz="3400" b="0" i="0" u="none" strike="noStrike" cap="none">
-              <a:solidFill>
-                <a:schemeClr val="dk1"/>
-              </a:solidFill>
-              <a:latin typeface="Arial"/>
-              <a:ea typeface="Arial"/>
-              <a:cs typeface="Arial"/>
-              <a:sym typeface="Arial"/>
-            </a:endParaRPr>
-          </a:p>
-          <a:p>
-            <a:pPr marL="0" marR="0" lvl="0" indent="0" algn="l" rtl="0">
-              <a:spcBef>
-                <a:spcPts val="0"/>
-              </a:spcBef>
-              <a:spcAft>
-                <a:spcPts val="0"/>
-              </a:spcAft>
-              <a:buNone/>
-            </a:pPr>
-            <a:endParaRPr sz="3400" b="0" i="0" u="none" strike="noStrike" cap="none">
-              <a:solidFill>
-                <a:schemeClr val="dk1"/>
-              </a:solidFill>
-              <a:latin typeface="Arial"/>
-              <a:ea typeface="Arial"/>
-              <a:cs typeface="Arial"/>
-              <a:sym typeface="Arial"/>
-            </a:endParaRPr>
-          </a:p>
-          <a:p>
-            <a:pPr marL="0" marR="0" lvl="0" indent="0" algn="l" rtl="0">
-              <a:spcBef>
-                <a:spcPts val="0"/>
-              </a:spcBef>
-              <a:spcAft>
-                <a:spcPts val="0"/>
-              </a:spcAft>
-              <a:buNone/>
-            </a:pPr>
-            <a:endParaRPr sz="3400" b="0" i="0" u="none" strike="noStrike" cap="none">
-              <a:solidFill>
-                <a:schemeClr val="dk1"/>
-              </a:solidFill>
-              <a:latin typeface="Arial"/>
-              <a:ea typeface="Arial"/>
-              <a:cs typeface="Arial"/>
-              <a:sym typeface="Arial"/>
-            </a:endParaRPr>
-          </a:p>
-          <a:p>
-            <a:pPr marL="0" marR="0" lvl="0" indent="0" algn="l" rtl="0">
-              <a:spcBef>
-                <a:spcPts val="0"/>
-              </a:spcBef>
-              <a:spcAft>
-                <a:spcPts val="0"/>
-              </a:spcAft>
-              <a:buNone/>
-            </a:pPr>
-            <a:endParaRPr sz="3400" b="0" i="0" u="none" strike="noStrike" cap="none">
-              <a:solidFill>
-                <a:schemeClr val="dk1"/>
-              </a:solidFill>
-              <a:latin typeface="Arial"/>
-              <a:ea typeface="Arial"/>
-              <a:cs typeface="Arial"/>
-              <a:sym typeface="Arial"/>
-            </a:endParaRPr>
           </a:p>
         </p:txBody>
       </p:sp>
@@ -12113,7 +11923,7 @@
         </p:nvSpPr>
         <p:spPr>
           <a:xfrm>
-            <a:off x="16884285" y="26438203"/>
+            <a:off x="16884286" y="26438203"/>
             <a:ext cx="4218600" cy="2908500"/>
           </a:xfrm>
           <a:prstGeom prst="rect">
@@ -12139,7 +11949,7 @@
               </a:spcAft>
               <a:buNone/>
             </a:pPr>
-            <a:endParaRPr sz="4800">
+            <a:endParaRPr sz="4800" dirty="0">
               <a:solidFill>
                 <a:schemeClr val="dk1"/>
               </a:solidFill>
@@ -12160,7 +11970,7 @@
               <a:buNone/>
             </a:pPr>
             <a:r>
-              <a:rPr lang="en-US" sz="4800" b="0" i="0" u="none" strike="noStrike" cap="none">
+              <a:rPr lang="en-US" sz="4800" b="0" i="0" u="none" strike="noStrike" cap="none" dirty="0">
                 <a:solidFill>
                   <a:schemeClr val="dk1"/>
                 </a:solidFill>
@@ -12171,7 +11981,7 @@
               </a:rPr>
               <a:t>Tuning Menu</a:t>
             </a:r>
-            <a:endParaRPr sz="4800">
+            <a:endParaRPr sz="4800" dirty="0">
               <a:solidFill>
                 <a:schemeClr val="dk1"/>
               </a:solidFill>
@@ -12191,7 +12001,7 @@
         </p:nvSpPr>
         <p:spPr>
           <a:xfrm>
-            <a:off x="29656306" y="27066905"/>
+            <a:off x="29582794" y="27246253"/>
             <a:ext cx="3101100" cy="646200"/>
           </a:xfrm>
           <a:prstGeom prst="rect">
@@ -12218,7 +12028,7 @@
               <a:buNone/>
             </a:pPr>
             <a:r>
-              <a:rPr lang="en-US" sz="4800">
+              <a:rPr lang="en-US" sz="4800" dirty="0">
                 <a:solidFill>
                   <a:schemeClr val="dk1"/>
                 </a:solidFill>
@@ -12229,7 +12039,7 @@
               </a:rPr>
               <a:t>Scale Menu</a:t>
             </a:r>
-            <a:endParaRPr sz="4800">
+            <a:endParaRPr sz="4800" dirty="0">
               <a:solidFill>
                 <a:schemeClr val="dk1"/>
               </a:solidFill>
@@ -12318,7 +12128,7 @@
         </p:blipFill>
         <p:spPr>
           <a:xfrm>
-            <a:off x="34598999" y="18176076"/>
+            <a:off x="34598999" y="17435273"/>
             <a:ext cx="7692375" cy="3072100"/>
           </a:xfrm>
           <a:prstGeom prst="rect">
@@ -12338,7 +12148,7 @@
         </p:nvSpPr>
         <p:spPr>
           <a:xfrm>
-            <a:off x="36084775" y="21529900"/>
+            <a:off x="36178686" y="20578069"/>
             <a:ext cx="4533000" cy="784200"/>
           </a:xfrm>
           <a:prstGeom prst="rect">
@@ -12365,7 +12175,7 @@
               <a:buNone/>
             </a:pPr>
             <a:r>
-              <a:rPr lang="en-US" sz="4800">
+              <a:rPr lang="en-US" sz="4800" dirty="0">
                 <a:latin typeface="Calibri"/>
                 <a:ea typeface="Calibri"/>
                 <a:cs typeface="Calibri"/>
@@ -12373,7 +12183,7 @@
               </a:rPr>
               <a:t>Metronome Window</a:t>
             </a:r>
-            <a:endParaRPr sz="4800">
+            <a:endParaRPr sz="4800" dirty="0">
               <a:latin typeface="Calibri"/>
               <a:ea typeface="Calibri"/>
               <a:cs typeface="Calibri"/>
@@ -12391,7 +12201,7 @@
               <a:buNone/>
             </a:pPr>
             <a:r>
-              <a:rPr lang="en-US" sz="2400">
+              <a:rPr lang="en-US" sz="2400" dirty="0">
                 <a:latin typeface="Calibri"/>
                 <a:ea typeface="Calibri"/>
                 <a:cs typeface="Calibri"/>
@@ -12399,7 +12209,7 @@
               </a:rPr>
               <a:t>(UI not finalized)</a:t>
             </a:r>
-            <a:endParaRPr sz="2400">
+            <a:endParaRPr sz="2400" dirty="0">
               <a:latin typeface="Calibri"/>
               <a:ea typeface="Calibri"/>
               <a:cs typeface="Calibri"/>

</xml_diff>